<commit_message>
refactoring dans le readme
</commit_message>
<xml_diff>
--- a/INF5071.pptx
+++ b/INF5071.pptx
@@ -6324,7 +6324,7 @@
           <a:p>
             <a:r>
               <a:rPr lang="fr-CA" dirty="0"/>
-              <a:t>5- les technologies utilisées</a:t>
+              <a:t>5- Les technologies utilisées</a:t>
             </a:r>
           </a:p>
           <a:p>
@@ -6451,7 +6451,7 @@
           <a:p>
             <a:r>
               <a:rPr lang="fr-CA" dirty="0"/>
-              <a:t>Définition des taches de chaque membre d’équipe</a:t>
+              <a:t>Définition des tâches de chaque membre d’équipe</a:t>
             </a:r>
           </a:p>
           <a:p>

</xml_diff>

<commit_message>
Derniere Push, update read.me
</commit_message>
<xml_diff>
--- a/INF5071.pptx
+++ b/INF5071.pptx
@@ -6307,6 +6307,18 @@
           <a:p>
             <a:r>
               <a:rPr lang="en-CA" dirty="0"/>
+              <a:t>Mod</a:t>
+            </a:r>
+            <a:r>
+              <a:rPr lang="fr-CA" dirty="0" err="1"/>
+              <a:t>élisation</a:t>
+            </a:r>
+            <a:r>
+              <a:rPr lang="fr-CA" dirty="0"/>
+              <a:t> :</a:t>
+            </a:r>
+            <a:r>
+              <a:rPr lang="en-CA" dirty="0"/>
               <a:t>Debut du Face</a:t>
             </a:r>
           </a:p>
@@ -6387,18 +6399,25 @@
           <a:lstStyle/>
           <a:p>
             <a:r>
+              <a:rPr lang="en-CA" dirty="0"/>
+              <a:t>Mod</a:t>
+            </a:r>
+            <a:r>
+              <a:rPr lang="fr-CA" dirty="0" err="1"/>
+              <a:t>élisation</a:t>
+            </a:r>
+            <a:r>
+              <a:rPr lang="fr-CA" dirty="0"/>
+              <a:t> : </a:t>
+            </a:r>
+            <a:r>
               <a:rPr lang="en-CA" dirty="0" err="1"/>
               <a:t>Coutour</a:t>
             </a:r>
             <a:r>
               <a:rPr lang="en-CA" dirty="0"/>
-              <a:t> de la </a:t>
-            </a:r>
-            <a:r>
-              <a:rPr lang="en-CA" dirty="0" err="1"/>
-              <a:t>tete</a:t>
-            </a:r>
-            <a:endParaRPr lang="en-CA" dirty="0"/>
+              <a:t> de la tête</a:t>
+            </a:r>
           </a:p>
         </p:txBody>
       </p:sp>
@@ -6478,7 +6497,19 @@
           <a:p>
             <a:r>
               <a:rPr lang="en-CA" dirty="0"/>
-              <a:t>Le </a:t>
+              <a:t>Mod</a:t>
+            </a:r>
+            <a:r>
+              <a:rPr lang="fr-CA" dirty="0" err="1"/>
+              <a:t>élisation</a:t>
+            </a:r>
+            <a:r>
+              <a:rPr lang="fr-CA" dirty="0"/>
+              <a:t> :</a:t>
+            </a:r>
+            <a:r>
+              <a:rPr lang="en-CA" dirty="0"/>
+              <a:t>La </a:t>
             </a:r>
             <a:r>
               <a:rPr lang="en-CA" dirty="0" err="1"/>
@@ -6557,15 +6588,33 @@
             <p:ph type="title"/>
           </p:nvPr>
         </p:nvSpPr>
-        <p:spPr/>
+        <p:spPr>
+          <a:xfrm>
+            <a:off x="677334" y="585216"/>
+            <a:ext cx="8596668" cy="1320800"/>
+          </a:xfrm>
+        </p:spPr>
         <p:txBody>
           <a:bodyPr/>
           <a:lstStyle/>
           <a:p>
             <a:r>
               <a:rPr lang="en-CA" dirty="0"/>
-              <a:t>Bras</a:t>
-            </a:r>
+              <a:t>Mod</a:t>
+            </a:r>
+            <a:r>
+              <a:rPr lang="fr-CA" dirty="0" err="1"/>
+              <a:t>élisation</a:t>
+            </a:r>
+            <a:r>
+              <a:rPr lang="fr-CA" dirty="0"/>
+              <a:t> : Les b</a:t>
+            </a:r>
+            <a:r>
+              <a:rPr lang="en-CA" dirty="0" err="1"/>
+              <a:t>ras</a:t>
+            </a:r>
+            <a:endParaRPr lang="en-CA" dirty="0"/>
           </a:p>
         </p:txBody>
       </p:sp>
@@ -6645,6 +6694,18 @@
           <a:p>
             <a:r>
               <a:rPr lang="en-CA" dirty="0"/>
+              <a:t>Mod</a:t>
+            </a:r>
+            <a:r>
+              <a:rPr lang="fr-CA" dirty="0" err="1"/>
+              <a:t>élisation</a:t>
+            </a:r>
+            <a:r>
+              <a:rPr lang="fr-CA" dirty="0"/>
+              <a:t> : </a:t>
+            </a:r>
+            <a:r>
+              <a:rPr lang="en-CA" dirty="0"/>
               <a:t>Corps complete</a:t>
             </a:r>
           </a:p>
@@ -6726,7 +6787,7 @@
           <a:p>
             <a:r>
               <a:rPr lang="en-CA" dirty="0"/>
-              <a:t>Mesh </a:t>
+              <a:t>Texture </a:t>
             </a:r>
           </a:p>
         </p:txBody>

</xml_diff>